<commit_message>
Lightning talks set up
</commit_message>
<xml_diff>
--- a/OlympicAthletics.pptx
+++ b/OlympicAthletics.pptx
@@ -221,7 +221,7 @@
           <a:p>
             <a:fld id="{B56F32FC-4BD9-442A-A8C6-51598C909FE3}" type="datetimeFigureOut">
               <a:rPr lang="en-US" smtClean="0"/>
-              <a:t>12/11/2022</a:t>
+              <a:t>12/11/22</a:t>
             </a:fld>
             <a:endParaRPr lang="en-US" dirty="0"/>
           </a:p>
@@ -299,7 +299,7 @@
           <a:p>
             <a:fld id="{28EEFA9E-C190-4F5C-8394-BD5F1CD55C02}" type="slidenum">
               <a:rPr lang="en-US" smtClean="0"/>
-              <a:t>‹#›</a:t>
+              <a:t>‹Nº›</a:t>
             </a:fld>
             <a:endParaRPr lang="en-US" dirty="0"/>
           </a:p>
@@ -398,7 +398,7 @@
           <a:p>
             <a:fld id="{056371FA-A98D-41E8-93F4-09945841298A}" type="datetimeFigureOut">
               <a:rPr lang="en-US" smtClean="0"/>
-              <a:t>12/11/2022</a:t>
+              <a:t>12/11/22</a:t>
             </a:fld>
             <a:endParaRPr lang="en-US" dirty="0"/>
           </a:p>
@@ -556,7 +556,7 @@
           <a:p>
             <a:fld id="{22289C57-55D7-40A4-A101-E74FAC7A092B}" type="slidenum">
               <a:rPr lang="en-US" smtClean="0"/>
-              <a:t>‹#›</a:t>
+              <a:t>‹Nº›</a:t>
             </a:fld>
             <a:endParaRPr lang="en-US" dirty="0"/>
           </a:p>
@@ -1141,7 +1141,7 @@
             <a:fld id="{A49DFD55-3C28-40EF-9E31-A92D2E4017FF}" type="slidenum">
               <a:rPr lang="en-US" smtClean="0"/>
               <a:pPr/>
-              <a:t>‹#›</a:t>
+              <a:t>‹Nº›</a:t>
             </a:fld>
             <a:endParaRPr lang="en-US" dirty="0"/>
           </a:p>
@@ -1752,7 +1752,7 @@
             <a:fld id="{A49DFD55-3C28-40EF-9E31-A92D2E4017FF}" type="slidenum">
               <a:rPr lang="en-US" smtClean="0"/>
               <a:pPr/>
-              <a:t>‹#›</a:t>
+              <a:t>‹Nº›</a:t>
             </a:fld>
             <a:endParaRPr lang="en-US" dirty="0"/>
           </a:p>
@@ -2487,7 +2487,7 @@
             <a:fld id="{A49DFD55-3C28-40EF-9E31-A92D2E4017FF}" type="slidenum">
               <a:rPr lang="en-US" smtClean="0"/>
               <a:pPr/>
-              <a:t>‹#›</a:t>
+              <a:t>‹Nº›</a:t>
             </a:fld>
             <a:endParaRPr lang="en-US" dirty="0"/>
           </a:p>
@@ -3251,7 +3251,7 @@
             <a:fld id="{A49DFD55-3C28-40EF-9E31-A92D2E4017FF}" type="slidenum">
               <a:rPr lang="en-US" smtClean="0"/>
               <a:pPr/>
-              <a:t>‹#›</a:t>
+              <a:t>‹Nº›</a:t>
             </a:fld>
             <a:endParaRPr lang="en-US" dirty="0"/>
           </a:p>
@@ -3785,7 +3785,7 @@
             <a:fld id="{A49DFD55-3C28-40EF-9E31-A92D2E4017FF}" type="slidenum">
               <a:rPr lang="en-US" smtClean="0"/>
               <a:pPr/>
-              <a:t>‹#›</a:t>
+              <a:t>‹Nº›</a:t>
             </a:fld>
             <a:endParaRPr lang="en-US" dirty="0"/>
           </a:p>
@@ -4105,7 +4105,7 @@
             <a:fld id="{A49DFD55-3C28-40EF-9E31-A92D2E4017FF}" type="slidenum">
               <a:rPr lang="en-US" smtClean="0"/>
               <a:pPr/>
-              <a:t>‹#›</a:t>
+              <a:t>‹Nº›</a:t>
             </a:fld>
             <a:endParaRPr lang="en-US" dirty="0"/>
           </a:p>
@@ -4454,7 +4454,7 @@
             <a:fld id="{A49DFD55-3C28-40EF-9E31-A92D2E4017FF}" type="slidenum">
               <a:rPr lang="en-US" smtClean="0"/>
               <a:pPr/>
-              <a:t>‹#›</a:t>
+              <a:t>‹Nº›</a:t>
             </a:fld>
             <a:endParaRPr lang="en-US" dirty="0"/>
           </a:p>
@@ -4766,7 +4766,7 @@
             <a:fld id="{A49DFD55-3C28-40EF-9E31-A92D2E4017FF}" type="slidenum">
               <a:rPr lang="en-US" smtClean="0"/>
               <a:pPr/>
-              <a:t>‹#›</a:t>
+              <a:t>‹Nº›</a:t>
             </a:fld>
             <a:endParaRPr lang="en-US" dirty="0"/>
           </a:p>
@@ -5239,7 +5239,7 @@
             <a:fld id="{A49DFD55-3C28-40EF-9E31-A92D2E4017FF}" type="slidenum">
               <a:rPr lang="en-US" smtClean="0"/>
               <a:pPr/>
-              <a:t>‹#›</a:t>
+              <a:t>‹Nº›</a:t>
             </a:fld>
             <a:endParaRPr lang="en-US" dirty="0"/>
           </a:p>
@@ -5481,7 +5481,7 @@
             <a:fld id="{A49DFD55-3C28-40EF-9E31-A92D2E4017FF}" type="slidenum">
               <a:rPr lang="en-US" smtClean="0"/>
               <a:pPr/>
-              <a:t>‹#›</a:t>
+              <a:t>‹Nº›</a:t>
             </a:fld>
             <a:endParaRPr lang="en-US" dirty="0"/>
           </a:p>
@@ -5787,7 +5787,7 @@
             <a:fld id="{A49DFD55-3C28-40EF-9E31-A92D2E4017FF}" type="slidenum">
               <a:rPr lang="en-US" smtClean="0"/>
               <a:pPr/>
-              <a:t>‹#›</a:t>
+              <a:t>‹Nº›</a:t>
             </a:fld>
             <a:endParaRPr lang="en-US" dirty="0"/>
           </a:p>
@@ -6807,7 +6807,7 @@
             <a:fld id="{A49DFD55-3C28-40EF-9E31-A92D2E4017FF}" type="slidenum">
               <a:rPr lang="en-US" smtClean="0"/>
               <a:pPr/>
-              <a:t>‹#›</a:t>
+              <a:t>‹Nº›</a:t>
             </a:fld>
             <a:endParaRPr lang="en-US" dirty="0"/>
           </a:p>
@@ -8894,7 +8894,7 @@
             <a:fld id="{A49DFD55-3C28-40EF-9E31-A92D2E4017FF}" type="slidenum">
               <a:rPr lang="en-US" smtClean="0"/>
               <a:pPr/>
-              <a:t>‹#›</a:t>
+              <a:t>‹Nº›</a:t>
             </a:fld>
             <a:endParaRPr lang="en-US" dirty="0"/>
           </a:p>
@@ -9173,7 +9173,7 @@
           <a:p>
             <a:fld id="{A49DFD55-3C28-40EF-9E31-A92D2E4017FF}" type="slidenum">
               <a:rPr lang="en-US" smtClean="0"/>
-              <a:t>‹#›</a:t>
+              <a:t>‹Nº›</a:t>
             </a:fld>
             <a:endParaRPr lang="en-US" dirty="0"/>
           </a:p>
@@ -9999,6 +9999,24 @@
           <a:bodyPr/>
           <a:lstStyle/>
           <a:p>
+            <a:r>
+              <a:rPr lang="en-US" dirty="0">
+                <a:hlinkClick r:id="rId2"/>
+              </a:rPr>
+              <a:t>https://mlloyd05.shinyapps.io/</a:t>
+            </a:r>
+            <a:r>
+              <a:rPr lang="en-US" dirty="0" err="1">
+                <a:hlinkClick r:id="rId2"/>
+              </a:rPr>
+              <a:t>Combined_Prototypes</a:t>
+            </a:r>
+            <a:r>
+              <a:rPr lang="en-US" dirty="0">
+                <a:hlinkClick r:id="rId2"/>
+              </a:rPr>
+              <a:t>/</a:t>
+            </a:r>
             <a:endParaRPr lang="en-US" dirty="0"/>
           </a:p>
         </p:txBody>
@@ -11352,6 +11370,15 @@
 </file>
 
 <file path=customXml/item1.xml><?xml version="1.0" encoding="utf-8"?>
+<?mso-contentType ?>
+<FormTemplates xmlns="http://schemas.microsoft.com/sharepoint/v3/contenttype/forms">
+  <Display>DocumentLibraryForm</Display>
+  <Edit>DocumentLibraryForm</Edit>
+  <New>DocumentLibraryForm</New>
+</FormTemplates>
+</file>
+
+<file path=customXml/item2.xml><?xml version="1.0" encoding="utf-8"?>
 <p:properties xmlns:p="http://schemas.microsoft.com/office/2006/metadata/properties" xmlns:xsi="http://www.w3.org/2001/XMLSchema-instance" xmlns:pc="http://schemas.microsoft.com/office/infopath/2007/PartnerControls">
   <documentManagement>
     <_ip_UnifiedCompliancePolicyUIAction xmlns="http://schemas.microsoft.com/sharepoint/v3" xsi:nil="true"/>
@@ -11368,15 +11395,6 @@
     <MediaServiceKeyPoints xmlns="71af3243-3dd4-4a8d-8c0d-dd76da1f02a5" xsi:nil="true"/>
   </documentManagement>
 </p:properties>
-</file>
-
-<file path=customXml/item2.xml><?xml version="1.0" encoding="utf-8"?>
-<?mso-contentType ?>
-<FormTemplates xmlns="http://schemas.microsoft.com/sharepoint/v3/contenttype/forms">
-  <Display>DocumentLibraryForm</Display>
-  <Edit>DocumentLibraryForm</Edit>
-  <New>DocumentLibraryForm</New>
-</FormTemplates>
 </file>
 
 <file path=customXml/item3.xml><?xml version="1.0" encoding="utf-8"?>
@@ -11656,6 +11674,14 @@
 </file>
 
 <file path=customXml/itemProps1.xml><?xml version="1.0" encoding="utf-8"?>
+<ds:datastoreItem xmlns:ds="http://schemas.openxmlformats.org/officeDocument/2006/customXml" ds:itemID="{0FD6FE22-81A0-4500-AFD0-342D21BB9A2C}">
+  <ds:schemaRefs>
+    <ds:schemaRef ds:uri="http://schemas.microsoft.com/sharepoint/v3/contenttype/forms"/>
+  </ds:schemaRefs>
+</ds:datastoreItem>
+</file>
+
+<file path=customXml/itemProps2.xml><?xml version="1.0" encoding="utf-8"?>
 <ds:datastoreItem xmlns:ds="http://schemas.openxmlformats.org/officeDocument/2006/customXml" ds:itemID="{29C43685-694E-4579-B109-3C418D49DA65}">
   <ds:schemaRefs>
     <ds:schemaRef ds:uri="http://schemas.microsoft.com/office/2006/metadata/properties"/>
@@ -11663,14 +11689,6 @@
     <ds:schemaRef ds:uri="http://schemas.microsoft.com/sharepoint/v3"/>
     <ds:schemaRef ds:uri="71af3243-3dd4-4a8d-8c0d-dd76da1f02a5"/>
     <ds:schemaRef ds:uri="230e9df3-be65-4c73-a93b-d1236ebd677e"/>
-  </ds:schemaRefs>
-</ds:datastoreItem>
-</file>
-
-<file path=customXml/itemProps2.xml><?xml version="1.0" encoding="utf-8"?>
-<ds:datastoreItem xmlns:ds="http://schemas.openxmlformats.org/officeDocument/2006/customXml" ds:itemID="{0FD6FE22-81A0-4500-AFD0-342D21BB9A2C}">
-  <ds:schemaRefs>
-    <ds:schemaRef ds:uri="http://schemas.microsoft.com/sharepoint/v3/contenttype/forms"/>
   </ds:schemaRefs>
 </ds:datastoreItem>
 </file>

</xml_diff>